<commit_message>
sista commit innan opponering
</commit_message>
<xml_diff>
--- a/säsongsrapport höst 2022.pptx
+++ b/säsongsrapport höst 2022.pptx
@@ -3341,7 +3341,7 @@
             </a:r>
             <a:br/>
             <a:r>
-              <a:t>	13 (129) - 46 % (34 %)</a:t>
+              <a:t>	13 (129) - 34 % (46 %) </a:t>
             </a:r>
           </a:p>
           <a:p>
@@ -3466,7 +3466,7 @@
             </a:r>
             <a:br/>
             <a:r>
-              <a:t>	25 (154) - 54 % (66 %)</a:t>
+              <a:t>	25 (154) - 66 % (54 %) </a:t>
             </a:r>
           </a:p>
           <a:p>
@@ -3546,14 +3546,6 @@
 <file path=ppt/slides/slide3.xml><?xml version="1.0" encoding="utf-8"?>
 <p:sld xmlns:a="http://schemas.openxmlformats.org/drawingml/2006/main" xmlns:p="http://schemas.openxmlformats.org/presentationml/2006/main" xmlns:r="http://schemas.openxmlformats.org/officeDocument/2006/relationships">
   <p:cSld>
-    <p:bg>
-      <p:bgPr>
-        <a:solidFill>
-          <a:srgbClr val="FFFFFF"/>
-        </a:solidFill>
-        <a:effectLst/>
-      </p:bgPr>
-    </p:bg>
     <p:spTree>
       <p:nvGrpSpPr>
         <p:cNvPr id="1" name=""/>
@@ -4782,7 +4774,7 @@
             </a:r>
             <a:br/>
             <a:r>
-              <a:t>	35.0 %,  54.9 %, 56.0 %</a:t>
+              <a:t>	35.0 % 54.9 % 56.0 %</a:t>
             </a:r>
           </a:p>
         </p:txBody>
@@ -4875,7 +4867,7 @@
             </a:r>
             <a:br/>
             <a:r>
-              <a:t>	65.0 %,  45.1 %, 44.0 %</a:t>
+              <a:t>	65.0 % 45.1 % 44.0 %</a:t>
             </a:r>
           </a:p>
         </p:txBody>
@@ -5518,7 +5510,7 @@
       </p:graphicFrame>
       <p:pic>
         <p:nvPicPr>
-          <p:cNvPr id="6" name="Picture 5" descr="summary ofNärkampers utfall givet lags innehav före.png"/>
+          <p:cNvPr id="6" name="Picture 5" descr="säsongsrapport Närkampers utfall givet lags innehav före.png"/>
           <p:cNvPicPr>
             <a:picLocks noChangeAspect="1"/>
           </p:cNvPicPr>
@@ -5596,7 +5588,7 @@
       </p:sp>
       <p:pic>
         <p:nvPicPr>
-          <p:cNvPr id="3" name="Picture 2" descr="summary of all duel locations.png"/>
+          <p:cNvPr id="3" name="Picture 2" descr="säsongsrapport  all duel locations.png"/>
           <p:cNvPicPr>
             <a:picLocks noChangeAspect="1"/>
           </p:cNvPicPr>
@@ -5674,7 +5666,7 @@
       </p:sp>
       <p:pic>
         <p:nvPicPr>
-          <p:cNvPr id="3" name="Picture 2" descr="summary of team won duel locations.png"/>
+          <p:cNvPr id="3" name="Picture 2" descr="säsongsrapport  team won duel locations.png"/>
           <p:cNvPicPr>
             <a:picLocks noChangeAspect="1"/>
           </p:cNvPicPr>

</xml_diff>